<commit_message>
fixed bug where averages were calculated incorrectly
</commit_message>
<xml_diff>
--- a/results/screentime.pptx
+++ b/results/screentime.pptx
@@ -3337,7 +3337,7 @@
           <p:cNvPr id="2" name="slide1">
             <a:extLst>
               <a:ext uri="{FF2B5EF4-FFF2-40B4-BE49-F238E27FC236}">
-                <a16:creationId xmlns:a16="http://schemas.microsoft.com/office/drawing/2014/main" id="{D2B373BA-F027-445E-ACFA-37B363707EF4}"/>
+                <a16:creationId xmlns:a16="http://schemas.microsoft.com/office/drawing/2014/main" id="{A1249498-1135-40DB-B6AC-B0C477ACC0A2}"/>
               </a:ext>
             </a:extLst>
           </p:cNvPr>
@@ -3354,36 +3354,42 @@
           <a:lstStyle/>
           <a:p>
             <a:r>
+              <a:t>screentime</a:t>
+            </a:r>
+          </a:p>
+        </p:txBody>
+      </p:sp>
+      <p:sp>
+        <p:nvSpPr>
+          <p:cNvPr id="3" name="slide1">
+            <a:extLst>
+              <a:ext uri="{FF2B5EF4-FFF2-40B4-BE49-F238E27FC236}">
+                <a16:creationId xmlns:a16="http://schemas.microsoft.com/office/drawing/2014/main" id="{7E35964F-F4FF-49F7-A76B-B2E86B9F6266}"/>
+              </a:ext>
+            </a:extLst>
+          </p:cNvPr>
+          <p:cNvSpPr>
+            <a:spLocks noGrp="1"/>
+          </p:cNvSpPr>
+          <p:nvPr>
+            <p:ph type="subTitle" idx="1"/>
+          </p:nvPr>
+        </p:nvSpPr>
+        <p:spPr/>
+        <p:txBody>
+          <a:bodyPr/>
+          <a:lstStyle/>
+          <a:p>
+            <a:r>
               <a:rPr dirty="0"/>
-              <a:t>screentime</a:t>
-            </a:r>
-          </a:p>
-        </p:txBody>
-      </p:sp>
-      <p:sp>
-        <p:nvSpPr>
-          <p:cNvPr id="3" name="slide1">
-            <a:extLst>
-              <a:ext uri="{FF2B5EF4-FFF2-40B4-BE49-F238E27FC236}">
-                <a16:creationId xmlns:a16="http://schemas.microsoft.com/office/drawing/2014/main" id="{74E5CB63-E40B-4921-8C46-215D608A747B}"/>
-              </a:ext>
-            </a:extLst>
-          </p:cNvPr>
-          <p:cNvSpPr>
-            <a:spLocks noGrp="1"/>
-          </p:cNvSpPr>
-          <p:nvPr>
-            <p:ph type="subTitle" idx="1"/>
-          </p:nvPr>
-        </p:nvSpPr>
-        <p:spPr/>
-        <p:txBody>
-          <a:bodyPr/>
-          <a:lstStyle/>
+              <a:t>File created on: 7/12/25 10:58:36 PM CDT</a:t>
+            </a:r>
+            <a:endParaRPr lang="en-US" dirty="0"/>
+          </a:p>
           <a:p>
             <a:r>
               <a:rPr lang="en-US" dirty="0"/>
-              <a:t>Created by Ryan Sponzilli in Tableau</a:t>
+              <a:t>Created by Ryan Sponzilli with Tableau</a:t>
             </a:r>
             <a:endParaRPr dirty="0"/>
           </a:p>
@@ -3424,7 +3430,7 @@
           <p:cNvPr id="2" name="slide2" descr="Spring 2025 Screentime Reflection1">
             <a:extLst>
               <a:ext uri="{FF2B5EF4-FFF2-40B4-BE49-F238E27FC236}">
-                <a16:creationId xmlns:a16="http://schemas.microsoft.com/office/drawing/2014/main" id="{A4B8266A-1696-4F6C-9DA3-78049E875275}"/>
+                <a16:creationId xmlns:a16="http://schemas.microsoft.com/office/drawing/2014/main" id="{B4CFAD9B-B94B-48B1-A145-1E929CC1B4BD}"/>
               </a:ext>
             </a:extLst>
           </p:cNvPr>
@@ -3490,7 +3496,7 @@
           <p:cNvPr id="3" name="slide3" descr="Spring 2025 Screentime Reflection4">
             <a:extLst>
               <a:ext uri="{FF2B5EF4-FFF2-40B4-BE49-F238E27FC236}">
-                <a16:creationId xmlns:a16="http://schemas.microsoft.com/office/drawing/2014/main" id="{358EC542-69F1-4041-89A9-915DE3AD4455}"/>
+                <a16:creationId xmlns:a16="http://schemas.microsoft.com/office/drawing/2014/main" id="{4DAFE639-9AFB-45E2-96F9-1A9E383C9DC9}"/>
               </a:ext>
             </a:extLst>
           </p:cNvPr>
@@ -3556,7 +3562,7 @@
           <p:cNvPr id="4" name="slide4" descr="Spring 2025 Screentime Reflection2">
             <a:extLst>
               <a:ext uri="{FF2B5EF4-FFF2-40B4-BE49-F238E27FC236}">
-                <a16:creationId xmlns:a16="http://schemas.microsoft.com/office/drawing/2014/main" id="{E3EC8966-D4F1-4DCC-B2FD-B6D2CBA20B14}"/>
+                <a16:creationId xmlns:a16="http://schemas.microsoft.com/office/drawing/2014/main" id="{FF140943-D12D-49C9-97AF-A4E1FE8A8FCC}"/>
               </a:ext>
             </a:extLst>
           </p:cNvPr>
@@ -3622,7 +3628,7 @@
           <p:cNvPr id="5" name="slide5" descr="Spring 2025 Screentime Reflection3">
             <a:extLst>
               <a:ext uri="{FF2B5EF4-FFF2-40B4-BE49-F238E27FC236}">
-                <a16:creationId xmlns:a16="http://schemas.microsoft.com/office/drawing/2014/main" id="{DED18A6D-BA09-430E-9399-425D62296975}"/>
+                <a16:creationId xmlns:a16="http://schemas.microsoft.com/office/drawing/2014/main" id="{8924E1AC-CE38-43CB-B8C7-2F9C0FB45B98}"/>
               </a:ext>
             </a:extLst>
           </p:cNvPr>
@@ -3688,7 +3694,7 @@
           <p:cNvPr id="6" name="slide6" descr="Spring 2025 Screentime Reflection5">
             <a:extLst>
               <a:ext uri="{FF2B5EF4-FFF2-40B4-BE49-F238E27FC236}">
-                <a16:creationId xmlns:a16="http://schemas.microsoft.com/office/drawing/2014/main" id="{D3059C82-69A8-401C-BC50-EE5D168133BD}"/>
+                <a16:creationId xmlns:a16="http://schemas.microsoft.com/office/drawing/2014/main" id="{DF7B9890-96E4-4BEA-ACF7-67A02F01D8F0}"/>
               </a:ext>
             </a:extLst>
           </p:cNvPr>
@@ -3754,7 +3760,7 @@
           <p:cNvPr id="7" name="slide7" descr="Spring 2025 Screentime Reflection6">
             <a:extLst>
               <a:ext uri="{FF2B5EF4-FFF2-40B4-BE49-F238E27FC236}">
-                <a16:creationId xmlns:a16="http://schemas.microsoft.com/office/drawing/2014/main" id="{5ED65DF5-8471-4AFE-A59D-C47BB854E5A0}"/>
+                <a16:creationId xmlns:a16="http://schemas.microsoft.com/office/drawing/2014/main" id="{50894185-F907-48DD-A496-86DE3C9B8723}"/>
               </a:ext>
             </a:extLst>
           </p:cNvPr>

</xml_diff>